<commit_message>
08/01/2020 - Final Commit
</commit_message>
<xml_diff>
--- a/2020 Pandemic Stock Analysis_07.30.2020.pptx
+++ b/2020 Pandemic Stock Analysis_07.30.2020.pptx
@@ -5,10 +5,10 @@
     <p:sldMasterId id="2147483828" r:id="rId4"/>
   </p:sldMasterIdLst>
   <p:notesMasterIdLst>
-    <p:notesMasterId r:id="rId16"/>
+    <p:notesMasterId r:id="rId17"/>
   </p:notesMasterIdLst>
   <p:handoutMasterIdLst>
-    <p:handoutMasterId r:id="rId17"/>
+    <p:handoutMasterId r:id="rId18"/>
   </p:handoutMasterIdLst>
   <p:sldIdLst>
     <p:sldId id="256" r:id="rId5"/>
@@ -20,8 +20,9 @@
     <p:sldId id="263" r:id="rId11"/>
     <p:sldId id="267" r:id="rId12"/>
     <p:sldId id="264" r:id="rId13"/>
-    <p:sldId id="265" r:id="rId14"/>
-    <p:sldId id="266" r:id="rId15"/>
+    <p:sldId id="268" r:id="rId14"/>
+    <p:sldId id="265" r:id="rId15"/>
+    <p:sldId id="266" r:id="rId16"/>
   </p:sldIdLst>
   <p:sldSz cx="12192000" cy="6858000"/>
   <p:notesSz cx="6858000" cy="9144000"/>
@@ -134,8 +135,7 @@
 <file path=ppt/revisionInfo.xml><?xml version="1.0" encoding="utf-8"?>
 <p1510:revInfo xmlns:a="http://schemas.openxmlformats.org/drawingml/2006/main" xmlns:r="http://schemas.openxmlformats.org/officeDocument/2006/relationships" xmlns:p1510="http://schemas.microsoft.com/office/powerpoint/2015/10/main">
   <p1510:revLst>
-    <p1510:client id="{9E8E52F2-A620-4DF9-A308-A2A793834433}" v="103" dt="2020-07-30T22:31:51.994"/>
-    <p1510:client id="{B6DE8907-A8D0-4C81-B6AF-0D6F815E1692}" v="177" dt="2020-07-30T03:28:13.910"/>
+    <p1510:client id="{B6DE8907-A8D0-4C81-B6AF-0D6F815E1692}" v="179" dt="2020-08-01T05:43:29.587"/>
   </p1510:revLst>
 </p1510:revInfo>
 </file>
@@ -295,7 +295,7 @@
   <pc:docChgLst>
     <pc:chgData name="Salvador" userId="507b52caae7e5924" providerId="LiveId" clId="{B6DE8907-A8D0-4C81-B6AF-0D6F815E1692}"/>
     <pc:docChg chg="undo custSel mod addSld delSld modSld sldOrd">
-      <pc:chgData name="Salvador" userId="507b52caae7e5924" providerId="LiveId" clId="{B6DE8907-A8D0-4C81-B6AF-0D6F815E1692}" dt="2020-07-30T03:28:17.055" v="1706" actId="1076"/>
+      <pc:chgData name="Salvador" userId="507b52caae7e5924" providerId="LiveId" clId="{B6DE8907-A8D0-4C81-B6AF-0D6F815E1692}" dt="2020-08-01T05:52:19.102" v="5426" actId="20577"/>
       <pc:docMkLst>
         <pc:docMk/>
       </pc:docMkLst>
@@ -377,8 +377,8 @@
           </ac:picMkLst>
         </pc:picChg>
       </pc:sldChg>
-      <pc:sldChg chg="addSp delSp modSp mod modTransition setBg modAnim">
-        <pc:chgData name="Salvador" userId="507b52caae7e5924" providerId="LiveId" clId="{B6DE8907-A8D0-4C81-B6AF-0D6F815E1692}" dt="2020-07-29T03:56:27.384" v="1066" actId="20577"/>
+      <pc:sldChg chg="addSp delSp modSp mod modTransition setBg modAnim modNotesTx">
+        <pc:chgData name="Salvador" userId="507b52caae7e5924" providerId="LiveId" clId="{B6DE8907-A8D0-4C81-B6AF-0D6F815E1692}" dt="2020-07-31T03:46:21.563" v="4269" actId="6549"/>
         <pc:sldMkLst>
           <pc:docMk/>
           <pc:sldMk cId="4128952323" sldId="258"/>
@@ -400,7 +400,7 @@
           </ac:spMkLst>
         </pc:spChg>
         <pc:spChg chg="add mod">
-          <ac:chgData name="Salvador" userId="507b52caae7e5924" providerId="LiveId" clId="{B6DE8907-A8D0-4C81-B6AF-0D6F815E1692}" dt="2020-07-29T03:56:27.384" v="1066" actId="20577"/>
+          <ac:chgData name="Salvador" userId="507b52caae7e5924" providerId="LiveId" clId="{B6DE8907-A8D0-4C81-B6AF-0D6F815E1692}" dt="2020-07-31T01:54:38.591" v="2371" actId="20577"/>
           <ac:spMkLst>
             <pc:docMk/>
             <pc:sldMk cId="4128952323" sldId="258"/>
@@ -505,7 +505,7 @@
         </pc:picChg>
       </pc:sldChg>
       <pc:sldChg chg="addSp delSp modSp mod modTransition modAnim">
-        <pc:chgData name="Salvador" userId="507b52caae7e5924" providerId="LiveId" clId="{B6DE8907-A8D0-4C81-B6AF-0D6F815E1692}" dt="2020-07-29T04:27:53.602" v="1081"/>
+        <pc:chgData name="Salvador" userId="507b52caae7e5924" providerId="LiveId" clId="{B6DE8907-A8D0-4C81-B6AF-0D6F815E1692}" dt="2020-07-31T01:54:58.352" v="2374" actId="20577"/>
         <pc:sldMkLst>
           <pc:docMk/>
           <pc:sldMk cId="2067005262" sldId="259"/>
@@ -543,7 +543,7 @@
           </ac:spMkLst>
         </pc:spChg>
         <pc:spChg chg="add mod">
-          <ac:chgData name="Salvador" userId="507b52caae7e5924" providerId="LiveId" clId="{B6DE8907-A8D0-4C81-B6AF-0D6F815E1692}" dt="2020-07-29T03:57:03.468" v="1078" actId="1036"/>
+          <ac:chgData name="Salvador" userId="507b52caae7e5924" providerId="LiveId" clId="{B6DE8907-A8D0-4C81-B6AF-0D6F815E1692}" dt="2020-07-31T01:54:58.352" v="2374" actId="20577"/>
           <ac:spMkLst>
             <pc:docMk/>
             <pc:sldMk cId="2067005262" sldId="259"/>
@@ -584,13 +584,13 @@
         </pc:picChg>
       </pc:sldChg>
       <pc:sldChg chg="addSp delSp modSp mod modTransition delAnim modAnim">
-        <pc:chgData name="Salvador" userId="507b52caae7e5924" providerId="LiveId" clId="{B6DE8907-A8D0-4C81-B6AF-0D6F815E1692}" dt="2020-07-29T04:27:59.266" v="1083"/>
+        <pc:chgData name="Salvador" userId="507b52caae7e5924" providerId="LiveId" clId="{B6DE8907-A8D0-4C81-B6AF-0D6F815E1692}" dt="2020-07-31T01:01:30.677" v="2360" actId="20577"/>
         <pc:sldMkLst>
           <pc:docMk/>
           <pc:sldMk cId="2673849116" sldId="260"/>
         </pc:sldMkLst>
         <pc:spChg chg="mod">
-          <ac:chgData name="Salvador" userId="507b52caae7e5924" providerId="LiveId" clId="{B6DE8907-A8D0-4C81-B6AF-0D6F815E1692}" dt="2020-07-29T03:44:12.660" v="506" actId="1076"/>
+          <ac:chgData name="Salvador" userId="507b52caae7e5924" providerId="LiveId" clId="{B6DE8907-A8D0-4C81-B6AF-0D6F815E1692}" dt="2020-07-31T01:01:30.677" v="2360" actId="20577"/>
           <ac:spMkLst>
             <pc:docMk/>
             <pc:sldMk cId="2673849116" sldId="260"/>
@@ -653,7 +653,7 @@
         </pc:sldMkLst>
       </pc:sldChg>
       <pc:sldChg chg="addSp delSp modSp add mod ord modTransition modAnim">
-        <pc:chgData name="Salvador" userId="507b52caae7e5924" providerId="LiveId" clId="{B6DE8907-A8D0-4C81-B6AF-0D6F815E1692}" dt="2020-07-29T04:27:55.730" v="1082"/>
+        <pc:chgData name="Salvador" userId="507b52caae7e5924" providerId="LiveId" clId="{B6DE8907-A8D0-4C81-B6AF-0D6F815E1692}" dt="2020-07-31T01:55:22.262" v="2377" actId="20577"/>
         <pc:sldMkLst>
           <pc:docMk/>
           <pc:sldMk cId="3448121398" sldId="262"/>
@@ -667,7 +667,7 @@
           </ac:spMkLst>
         </pc:spChg>
         <pc:spChg chg="add mod">
-          <ac:chgData name="Salvador" userId="507b52caae7e5924" providerId="LiveId" clId="{B6DE8907-A8D0-4C81-B6AF-0D6F815E1692}" dt="2020-07-29T03:57:00.044" v="1073" actId="1036"/>
+          <ac:chgData name="Salvador" userId="507b52caae7e5924" providerId="LiveId" clId="{B6DE8907-A8D0-4C81-B6AF-0D6F815E1692}" dt="2020-07-31T01:55:22.262" v="2377" actId="20577"/>
           <ac:spMkLst>
             <pc:docMk/>
             <pc:sldMk cId="3448121398" sldId="262"/>
@@ -856,13 +856,13 @@
         </pc:picChg>
       </pc:sldChg>
       <pc:sldChg chg="addSp delSp modSp add mod ord">
-        <pc:chgData name="Salvador" userId="507b52caae7e5924" providerId="LiveId" clId="{B6DE8907-A8D0-4C81-B6AF-0D6F815E1692}" dt="2020-07-30T03:26:05.776" v="1666" actId="20577"/>
+        <pc:chgData name="Salvador" userId="507b52caae7e5924" providerId="LiveId" clId="{B6DE8907-A8D0-4C81-B6AF-0D6F815E1692}" dt="2020-08-01T05:43:26.935" v="4288" actId="21"/>
         <pc:sldMkLst>
           <pc:docMk/>
           <pc:sldMk cId="336215601" sldId="265"/>
         </pc:sldMkLst>
-        <pc:spChg chg="mod">
-          <ac:chgData name="Salvador" userId="507b52caae7e5924" providerId="LiveId" clId="{B6DE8907-A8D0-4C81-B6AF-0D6F815E1692}" dt="2020-07-30T03:26:05.776" v="1666" actId="20577"/>
+        <pc:spChg chg="add del mod">
+          <ac:chgData name="Salvador" userId="507b52caae7e5924" providerId="LiveId" clId="{B6DE8907-A8D0-4C81-B6AF-0D6F815E1692}" dt="2020-08-01T05:43:26.935" v="4288" actId="21"/>
           <ac:spMkLst>
             <pc:docMk/>
             <pc:sldMk cId="336215601" sldId="265"/>
@@ -875,6 +875,14 @@
             <pc:docMk/>
             <pc:sldMk cId="336215601" sldId="265"/>
             <ac:spMk id="3" creationId="{3FC7BD98-5486-489C-BAA0-A69CEFF691B3}"/>
+          </ac:spMkLst>
+        </pc:spChg>
+        <pc:spChg chg="add del mod">
+          <ac:chgData name="Salvador" userId="507b52caae7e5924" providerId="LiveId" clId="{B6DE8907-A8D0-4C81-B6AF-0D6F815E1692}" dt="2020-08-01T05:43:26.935" v="4288" actId="21"/>
+          <ac:spMkLst>
+            <pc:docMk/>
+            <pc:sldMk cId="336215601" sldId="265"/>
+            <ac:spMk id="4" creationId="{50BC9E21-8483-4667-8E03-FA63298FB9DB}"/>
           </ac:spMkLst>
         </pc:spChg>
         <pc:spChg chg="add del mod">
@@ -949,6 +957,51 @@
           </ac:picMkLst>
         </pc:picChg>
       </pc:sldChg>
+      <pc:sldChg chg="new del">
+        <pc:chgData name="Salvador" userId="507b52caae7e5924" providerId="LiveId" clId="{B6DE8907-A8D0-4C81-B6AF-0D6F815E1692}" dt="2020-07-31T00:34:47.349" v="2343" actId="680"/>
+        <pc:sldMkLst>
+          <pc:docMk/>
+          <pc:sldMk cId="1018070736" sldId="268"/>
+        </pc:sldMkLst>
+      </pc:sldChg>
+      <pc:sldChg chg="new del">
+        <pc:chgData name="Salvador" userId="507b52caae7e5924" providerId="LiveId" clId="{B6DE8907-A8D0-4C81-B6AF-0D6F815E1692}" dt="2020-07-30T23:44:30.057" v="2341" actId="680"/>
+        <pc:sldMkLst>
+          <pc:docMk/>
+          <pc:sldMk cId="1360502234" sldId="268"/>
+        </pc:sldMkLst>
+      </pc:sldChg>
+      <pc:sldChg chg="addSp delSp modSp add mod ord delAnim">
+        <pc:chgData name="Salvador" userId="507b52caae7e5924" providerId="LiveId" clId="{B6DE8907-A8D0-4C81-B6AF-0D6F815E1692}" dt="2020-08-01T05:52:19.102" v="5426" actId="20577"/>
+        <pc:sldMkLst>
+          <pc:docMk/>
+          <pc:sldMk cId="2081871002" sldId="268"/>
+        </pc:sldMkLst>
+        <pc:spChg chg="mod">
+          <ac:chgData name="Salvador" userId="507b52caae7e5924" providerId="LiveId" clId="{B6DE8907-A8D0-4C81-B6AF-0D6F815E1692}" dt="2020-08-01T05:44:11.373" v="4339" actId="20577"/>
+          <ac:spMkLst>
+            <pc:docMk/>
+            <pc:sldMk cId="2081871002" sldId="268"/>
+            <ac:spMk id="2" creationId="{51F70220-677A-411B-B416-94321A555329}"/>
+          </ac:spMkLst>
+        </pc:spChg>
+        <pc:spChg chg="add mod">
+          <ac:chgData name="Salvador" userId="507b52caae7e5924" providerId="LiveId" clId="{B6DE8907-A8D0-4C81-B6AF-0D6F815E1692}" dt="2020-08-01T05:52:19.102" v="5426" actId="20577"/>
+          <ac:spMkLst>
+            <pc:docMk/>
+            <pc:sldMk cId="2081871002" sldId="268"/>
+            <ac:spMk id="5" creationId="{D1D93474-54A5-4E38-93A2-B4BA49F61878}"/>
+          </ac:spMkLst>
+        </pc:spChg>
+        <pc:picChg chg="del">
+          <ac:chgData name="Salvador" userId="507b52caae7e5924" providerId="LiveId" clId="{B6DE8907-A8D0-4C81-B6AF-0D6F815E1692}" dt="2020-08-01T05:43:09.581" v="4275" actId="478"/>
+          <ac:picMkLst>
+            <pc:docMk/>
+            <pc:sldMk cId="2081871002" sldId="268"/>
+            <ac:picMk id="3" creationId="{A002A31A-70BE-4BCF-B357-2B225787603C}"/>
+          </ac:picMkLst>
+        </pc:picChg>
+      </pc:sldChg>
     </pc:docChg>
   </pc:docChgLst>
 </pc:chgInfo>
@@ -1048,7 +1101,7 @@
           <a:p>
             <a:fld id="{8369C108-6DA3-45F2-AE7E-50E80854775B}" type="datetimeFigureOut">
               <a:rPr lang="en-US" smtClean="0"/>
-              <a:t>7/30/2020</a:t>
+              <a:t>7/31/2020</a:t>
             </a:fld>
             <a:endParaRPr lang="en-US" dirty="0"/>
           </a:p>
@@ -1225,7 +1278,7 @@
           <a:p>
             <a:fld id="{476A73B2-5605-4CC4-ADC6-622651651079}" type="datetimeFigureOut">
               <a:rPr lang="en-US" smtClean="0"/>
-              <a:t>7/30/2020</a:t>
+              <a:t>7/31/2020</a:t>
             </a:fld>
             <a:endParaRPr lang="en-US" dirty="0"/>
           </a:p>
@@ -1650,7 +1703,7 @@
     </p:spTree>
     <p:extLst>
       <p:ext uri="{BB962C8B-B14F-4D97-AF65-F5344CB8AC3E}">
-        <p14:creationId xmlns:p14="http://schemas.microsoft.com/office/powerpoint/2010/main" val="1689018578"/>
+        <p14:creationId xmlns:p14="http://schemas.microsoft.com/office/powerpoint/2010/main" val="2108399299"/>
       </p:ext>
     </p:extLst>
   </p:cSld>
@@ -1726,6 +1779,90 @@
             <a:fld id="{CFED664B-377C-4B68-AF4E-EBDA643118DF}" type="slidenum">
               <a:rPr lang="en-US" smtClean="0"/>
               <a:t>11</a:t>
+            </a:fld>
+            <a:endParaRPr lang="en-US" dirty="0"/>
+          </a:p>
+        </p:txBody>
+      </p:sp>
+    </p:spTree>
+    <p:extLst>
+      <p:ext uri="{BB962C8B-B14F-4D97-AF65-F5344CB8AC3E}">
+        <p14:creationId xmlns:p14="http://schemas.microsoft.com/office/powerpoint/2010/main" val="1689018578"/>
+      </p:ext>
+    </p:extLst>
+  </p:cSld>
+  <p:clrMapOvr>
+    <a:masterClrMapping/>
+  </p:clrMapOvr>
+</p:notes>
+</file>
+
+<file path=ppt/notesSlides/notesSlide12.xml><?xml version="1.0" encoding="utf-8"?>
+<p:notes xmlns:a="http://schemas.openxmlformats.org/drawingml/2006/main" xmlns:r="http://schemas.openxmlformats.org/officeDocument/2006/relationships" xmlns:p="http://schemas.openxmlformats.org/presentationml/2006/main">
+  <p:cSld>
+    <p:spTree>
+      <p:nvGrpSpPr>
+        <p:cNvPr id="1" name=""/>
+        <p:cNvGrpSpPr/>
+        <p:nvPr/>
+      </p:nvGrpSpPr>
+      <p:grpSpPr>
+        <a:xfrm>
+          <a:off x="0" y="0"/>
+          <a:ext cx="0" cy="0"/>
+          <a:chOff x="0" y="0"/>
+          <a:chExt cx="0" cy="0"/>
+        </a:xfrm>
+      </p:grpSpPr>
+      <p:sp>
+        <p:nvSpPr>
+          <p:cNvPr id="2" name="Slide Image Placeholder 1"/>
+          <p:cNvSpPr>
+            <a:spLocks noGrp="1" noRot="1" noChangeAspect="1"/>
+          </p:cNvSpPr>
+          <p:nvPr>
+            <p:ph type="sldImg"/>
+          </p:nvPr>
+        </p:nvSpPr>
+        <p:spPr/>
+      </p:sp>
+      <p:sp>
+        <p:nvSpPr>
+          <p:cNvPr id="3" name="Notes Placeholder 2"/>
+          <p:cNvSpPr>
+            <a:spLocks noGrp="1"/>
+          </p:cNvSpPr>
+          <p:nvPr>
+            <p:ph type="body" idx="1"/>
+          </p:nvPr>
+        </p:nvSpPr>
+        <p:spPr/>
+        <p:txBody>
+          <a:bodyPr/>
+          <a:lstStyle/>
+          <a:p>
+            <a:endParaRPr lang="en-US" dirty="0"/>
+          </a:p>
+        </p:txBody>
+      </p:sp>
+      <p:sp>
+        <p:nvSpPr>
+          <p:cNvPr id="4" name="Slide Number Placeholder 3"/>
+          <p:cNvSpPr>
+            <a:spLocks noGrp="1"/>
+          </p:cNvSpPr>
+          <p:nvPr>
+            <p:ph type="sldNum" sz="quarter" idx="5"/>
+          </p:nvPr>
+        </p:nvSpPr>
+        <p:spPr/>
+        <p:txBody>
+          <a:bodyPr/>
+          <a:lstStyle/>
+          <a:p>
+            <a:fld id="{CFED664B-377C-4B68-AF4E-EBDA643118DF}" type="slidenum">
+              <a:rPr lang="en-US" smtClean="0"/>
+              <a:t>12</a:t>
             </a:fld>
             <a:endParaRPr lang="en-US" dirty="0"/>
           </a:p>
@@ -1872,7 +2009,104 @@
           <a:bodyPr/>
           <a:lstStyle/>
           <a:p>
+            <a:r>
+              <a:rPr lang="en-US" dirty="0"/>
+              <a:t>-First, lets take a look at the data we pulled from our </a:t>
+            </a:r>
+            <a:r>
+              <a:rPr lang="en-US" dirty="0" err="1"/>
+              <a:t>Finnhub</a:t>
+            </a:r>
+            <a:r>
+              <a:rPr lang="en-US" dirty="0"/>
+              <a:t> API. In this specific request, we were able to get basic information for specific ticker symbols in the Dow Index and get their 52 Week high / low date. </a:t>
+            </a:r>
+          </a:p>
+          <a:p>
+            <a:pPr marL="171450" indent="-171450">
+              <a:buFontTx/>
+              <a:buChar char="-"/>
+            </a:pPr>
+            <a:r>
+              <a:rPr lang="en-US" dirty="0"/>
+              <a:t>We then grouped and aggregated that data to show how stocks hit their high / low on specific dates. That is what you’re seeing here. </a:t>
+            </a:r>
+          </a:p>
+          <a:p>
+            <a:pPr marL="0" indent="0">
+              <a:buFontTx/>
+              <a:buNone/>
+            </a:pPr>
             <a:endParaRPr lang="en-US" dirty="0"/>
+          </a:p>
+          <a:p>
+            <a:pPr marL="171450" indent="-171450">
+              <a:buFontTx/>
+              <a:buChar char="-"/>
+            </a:pPr>
+            <a:r>
+              <a:rPr lang="en-US" dirty="0"/>
+              <a:t>But lets talk about the initial request before we grouped and aggregated it. When we plotted with ticker symbols of this specific index vs. dates. We saw something interesting…</a:t>
+            </a:r>
+          </a:p>
+          <a:p>
+            <a:pPr marL="171450" indent="-171450">
+              <a:buFontTx/>
+              <a:buChar char="-"/>
+            </a:pPr>
+            <a:r>
+              <a:rPr lang="en-US" dirty="0"/>
+              <a:t>Do you remember Bricks Graph in the previous slide showing the line graph of cases and deaths reported in March? This scatter plot with ticker symbols shows all the stocks that hit their 52 Week lows in March in Red</a:t>
+            </a:r>
+          </a:p>
+          <a:p>
+            <a:pPr marL="171450" indent="-171450">
+              <a:buFontTx/>
+              <a:buChar char="-"/>
+            </a:pPr>
+            <a:r>
+              <a:rPr lang="en-US" dirty="0"/>
+              <a:t>Also, you will see that some of these stocks hit there 52 Week High just before march and also after in Green</a:t>
+            </a:r>
+          </a:p>
+          <a:p>
+            <a:r>
+              <a:rPr lang="en-US" dirty="0"/>
+              <a:t>-I understand that in the scatter plot you’re not seeing actual values in the y-Axis. However, we wanted to visually show you how almost all the stocks in this index hit there 52 week low around the same time…. In March when Covid-19 first impacted the US. </a:t>
+            </a:r>
+          </a:p>
+          <a:p>
+            <a:endParaRPr lang="en-US" dirty="0"/>
+          </a:p>
+          <a:p>
+            <a:pPr marL="171450" indent="-171450">
+              <a:buFontTx/>
+              <a:buChar char="-"/>
+            </a:pPr>
+            <a:r>
+              <a:rPr lang="en-US" dirty="0"/>
+              <a:t>Now lets get back to the aggregated data…</a:t>
+            </a:r>
+          </a:p>
+          <a:p>
+            <a:pPr marL="171450" indent="-171450">
+              <a:buFontTx/>
+              <a:buChar char="-"/>
+            </a:pPr>
+            <a:r>
+              <a:rPr lang="en-US" dirty="0"/>
+              <a:t>This bar graph shows the counts of stocks in the Dow that hit their 52 Week High in Green / 52 Week low in Red by date. </a:t>
+            </a:r>
+          </a:p>
+          <a:p>
+            <a:pPr marL="171450" indent="-171450">
+              <a:buFontTx/>
+              <a:buChar char="-"/>
+            </a:pPr>
+            <a:r>
+              <a:rPr lang="en-US" dirty="0"/>
+              <a:t>Annotations have been provided to draw more attention to specific dates in which a high # of stocks hit their 52 Week low</a:t>
+            </a:r>
           </a:p>
         </p:txBody>
       </p:sp>
@@ -2579,7 +2813,7 @@
           <a:p>
             <a:fld id="{9AB3A824-1A51-4B26-AD58-A6D8E14F6C04}" type="datetimeFigureOut">
               <a:rPr lang="en-US" smtClean="0"/>
-              <a:t>7/30/2020</a:t>
+              <a:t>7/31/2020</a:t>
             </a:fld>
             <a:endParaRPr lang="en-US" dirty="0"/>
           </a:p>
@@ -2753,7 +2987,7 @@
           <a:p>
             <a:fld id="{D857E33E-8B18-4087-B112-809917729534}" type="datetimeFigureOut">
               <a:rPr lang="en-US" smtClean="0"/>
-              <a:t>7/30/2020</a:t>
+              <a:t>7/31/2020</a:t>
             </a:fld>
             <a:endParaRPr lang="en-US" dirty="0"/>
           </a:p>
@@ -2937,7 +3171,7 @@
           <a:p>
             <a:fld id="{D3FFE419-2371-464F-8239-3959401C3561}" type="datetimeFigureOut">
               <a:rPr lang="en-US" smtClean="0"/>
-              <a:t>7/30/2020</a:t>
+              <a:t>7/31/2020</a:t>
             </a:fld>
             <a:endParaRPr lang="en-US" dirty="0"/>
           </a:p>
@@ -3111,7 +3345,7 @@
           <a:p>
             <a:fld id="{97D162C4-EDD9-4389-A98B-B87ECEA2A816}" type="datetimeFigureOut">
               <a:rPr lang="en-US" smtClean="0"/>
-              <a:t>7/30/2020</a:t>
+              <a:t>7/31/2020</a:t>
             </a:fld>
             <a:endParaRPr lang="en-US" dirty="0"/>
           </a:p>
@@ -3383,7 +3617,7 @@
           <a:p>
             <a:fld id="{3E5059C3-6A89-4494-99FF-5A4D6FFD50EB}" type="datetimeFigureOut">
               <a:rPr lang="en-US" smtClean="0"/>
-              <a:t>7/30/2020</a:t>
+              <a:t>7/31/2020</a:t>
             </a:fld>
             <a:endParaRPr lang="en-US" dirty="0"/>
           </a:p>
@@ -3619,7 +3853,7 @@
           <a:p>
             <a:fld id="{CA954B2F-12DE-47F5-8894-472B206D2E1E}" type="datetimeFigureOut">
               <a:rPr lang="en-US" smtClean="0"/>
-              <a:t>7/30/2020</a:t>
+              <a:t>7/31/2020</a:t>
             </a:fld>
             <a:endParaRPr lang="en-US" dirty="0"/>
           </a:p>
@@ -3982,7 +4216,7 @@
           <a:p>
             <a:fld id="{3CBC1C18-307B-4F68-A007-B5B542270E8D}" type="datetimeFigureOut">
               <a:rPr lang="en-US" smtClean="0"/>
-              <a:t>7/30/2020</a:t>
+              <a:t>7/31/2020</a:t>
             </a:fld>
             <a:endParaRPr lang="en-US" dirty="0"/>
           </a:p>
@@ -4129,7 +4363,7 @@
           <a:p>
             <a:fld id="{1FAF3416-4057-4DAA-829D-4CA07428D088}" type="datetimeFigureOut">
               <a:rPr lang="en-US" smtClean="0"/>
-              <a:t>7/30/2020</a:t>
+              <a:t>7/31/2020</a:t>
             </a:fld>
             <a:endParaRPr lang="en-US" dirty="0"/>
           </a:p>
@@ -4228,7 +4462,7 @@
           <a:p>
             <a:fld id="{921D9284-D300-4297-87F7-E791DCC15DB1}" type="datetimeFigureOut">
               <a:rPr lang="en-US" smtClean="0"/>
-              <a:t>7/30/2020</a:t>
+              <a:t>7/31/2020</a:t>
             </a:fld>
             <a:endParaRPr lang="en-US" dirty="0"/>
           </a:p>
@@ -4589,7 +4823,7 @@
           <a:p>
             <a:fld id="{37D525BB-DA17-4BA0-B3C8-3AC3ABC827E6}" type="datetimeFigureOut">
               <a:rPr lang="en-US" smtClean="0"/>
-              <a:t>7/30/2020</a:t>
+              <a:t>7/31/2020</a:t>
             </a:fld>
             <a:endParaRPr lang="en-US" dirty="0"/>
           </a:p>
@@ -4950,7 +5184,7 @@
           <a:p>
             <a:fld id="{B16C4C9A-3960-41CF-A4E9-2A8FB932454B}" type="datetimeFigureOut">
               <a:rPr lang="en-US" smtClean="0"/>
-              <a:t>7/30/2020</a:t>
+              <a:t>7/31/2020</a:t>
             </a:fld>
             <a:endParaRPr lang="en-US" dirty="0"/>
           </a:p>
@@ -5196,7 +5430,7 @@
           <a:p>
             <a:fld id="{3CBC1C18-307B-4F68-A007-B5B542270E8D}" type="datetimeFigureOut">
               <a:rPr lang="en-US" smtClean="0"/>
-              <a:t>7/30/2020</a:t>
+              <a:t>7/31/2020</a:t>
             </a:fld>
             <a:endParaRPr lang="en-US" dirty="0"/>
           </a:p>
@@ -5936,6 +6170,350 @@
     <p:bg>
       <p:bgPr>
         <a:solidFill>
+          <a:schemeClr val="tx1">
+            <a:lumMod val="95000"/>
+            <a:lumOff val="5000"/>
+          </a:schemeClr>
+        </a:solidFill>
+        <a:effectLst/>
+      </p:bgPr>
+    </p:bg>
+    <p:spTree>
+      <p:nvGrpSpPr>
+        <p:cNvPr id="1" name=""/>
+        <p:cNvGrpSpPr/>
+        <p:nvPr/>
+      </p:nvGrpSpPr>
+      <p:grpSpPr>
+        <a:xfrm>
+          <a:off x="0" y="0"/>
+          <a:ext cx="0" cy="0"/>
+          <a:chOff x="0" y="0"/>
+          <a:chExt cx="0" cy="0"/>
+        </a:xfrm>
+      </p:grpSpPr>
+      <p:sp>
+        <p:nvSpPr>
+          <p:cNvPr id="2" name="Title 1">
+            <a:extLst>
+              <a:ext uri="{FF2B5EF4-FFF2-40B4-BE49-F238E27FC236}">
+                <a16:creationId xmlns:a16="http://schemas.microsoft.com/office/drawing/2014/main" id="{51F70220-677A-411B-B416-94321A555329}"/>
+              </a:ext>
+            </a:extLst>
+          </p:cNvPr>
+          <p:cNvSpPr>
+            <a:spLocks noGrp="1"/>
+          </p:cNvSpPr>
+          <p:nvPr>
+            <p:ph type="title"/>
+          </p:nvPr>
+        </p:nvSpPr>
+        <p:spPr>
+          <a:xfrm>
+            <a:off x="4789283" y="97931"/>
+            <a:ext cx="7228940" cy="1305356"/>
+          </a:xfrm>
+          <a:noFill/>
+          <a:ln w="31750" cap="sq">
+            <a:solidFill>
+              <a:schemeClr val="bg1"/>
+            </a:solidFill>
+            <a:miter lim="800000"/>
+          </a:ln>
+          <a:effectLst>
+            <a:glow rad="152400">
+              <a:schemeClr val="bg1">
+                <a:alpha val="13000"/>
+              </a:schemeClr>
+            </a:glow>
+          </a:effectLst>
+        </p:spPr>
+        <p:txBody>
+          <a:bodyPr vert="horz" wrap="square" lIns="182880" tIns="182880" rIns="182880" bIns="182880" rtlCol="0" anchor="ctr">
+            <a:normAutofit/>
+          </a:bodyPr>
+          <a:lstStyle/>
+          <a:p>
+            <a:r>
+              <a:rPr lang="en-US" dirty="0">
+                <a:solidFill>
+                  <a:schemeClr val="bg1"/>
+                </a:solidFill>
+              </a:rPr>
+              <a:t>Difficulties Faced and Lessons Learned</a:t>
+            </a:r>
+          </a:p>
+        </p:txBody>
+      </p:sp>
+      <p:pic>
+        <p:nvPicPr>
+          <p:cNvPr id="4" name="Picture 3" descr="Hand with pen pointing at financial numbers">
+            <a:extLst>
+              <a:ext uri="{FF2B5EF4-FFF2-40B4-BE49-F238E27FC236}">
+                <a16:creationId xmlns:a16="http://schemas.microsoft.com/office/drawing/2014/main" id="{AB2E0BE0-B684-4228-A4DF-58C8CAFFDF47}"/>
+              </a:ext>
+            </a:extLst>
+          </p:cNvPr>
+          <p:cNvPicPr>
+            <a:picLocks noChangeAspect="1"/>
+          </p:cNvPicPr>
+          <p:nvPr/>
+        </p:nvPicPr>
+        <p:blipFill rotWithShape="1">
+          <a:blip r:embed="rId3" cstate="print">
+            <a:extLst>
+              <a:ext uri="{28A0092B-C50C-407E-A947-70E740481C1C}">
+                <a14:useLocalDpi xmlns:a14="http://schemas.microsoft.com/office/drawing/2010/main"/>
+              </a:ext>
+            </a:extLst>
+          </a:blip>
+          <a:srcRect b="-1"/>
+          <a:stretch/>
+        </p:blipFill>
+        <p:spPr>
+          <a:xfrm>
+            <a:off x="20" y="10"/>
+            <a:ext cx="4657325" cy="6857990"/>
+          </a:xfrm>
+          <a:prstGeom prst="rect">
+            <a:avLst/>
+          </a:prstGeom>
+        </p:spPr>
+      </p:pic>
+      <p:sp>
+        <p:nvSpPr>
+          <p:cNvPr id="5" name="Title 1">
+            <a:extLst>
+              <a:ext uri="{FF2B5EF4-FFF2-40B4-BE49-F238E27FC236}">
+                <a16:creationId xmlns:a16="http://schemas.microsoft.com/office/drawing/2014/main" id="{D1D93474-54A5-4E38-93A2-B4BA49F61878}"/>
+              </a:ext>
+            </a:extLst>
+          </p:cNvPr>
+          <p:cNvSpPr txBox="1">
+            <a:spLocks/>
+          </p:cNvSpPr>
+          <p:nvPr/>
+        </p:nvSpPr>
+        <p:spPr bwMode="black">
+          <a:xfrm>
+            <a:off x="4789283" y="1601648"/>
+            <a:ext cx="7228939" cy="5031439"/>
+          </a:xfrm>
+          <a:prstGeom prst="rect">
+            <a:avLst/>
+          </a:prstGeom>
+          <a:noFill/>
+          <a:ln w="31750" cap="sq">
+            <a:solidFill>
+              <a:schemeClr val="bg1"/>
+            </a:solidFill>
+            <a:miter lim="800000"/>
+          </a:ln>
+          <a:effectLst>
+            <a:glow rad="152400">
+              <a:schemeClr val="tx1">
+                <a:alpha val="13000"/>
+              </a:schemeClr>
+            </a:glow>
+          </a:effectLst>
+        </p:spPr>
+        <p:txBody>
+          <a:bodyPr vert="horz" lIns="182880" tIns="182880" rIns="182880" bIns="182880" rtlCol="0" anchor="ctr">
+            <a:normAutofit fontScale="90000"/>
+          </a:bodyPr>
+          <a:lstStyle>
+            <a:lvl1pPr algn="ctr" defTabSz="914400" rtl="0" eaLnBrk="1" latinLnBrk="0" hangingPunct="1">
+              <a:lnSpc>
+                <a:spcPct val="90000"/>
+              </a:lnSpc>
+              <a:spcBef>
+                <a:spcPct val="0"/>
+              </a:spcBef>
+              <a:buNone/>
+              <a:defRPr sz="2800" kern="1200" cap="all" spc="200" baseline="0">
+                <a:solidFill>
+                  <a:srgbClr val="262626"/>
+                </a:solidFill>
+                <a:latin typeface="+mj-lt"/>
+                <a:ea typeface="+mj-ea"/>
+                <a:cs typeface="+mj-cs"/>
+              </a:defRPr>
+            </a:lvl1pPr>
+          </a:lstStyle>
+          <a:p>
+            <a:pPr marL="285750" indent="-285750" algn="l">
+              <a:buFont typeface="Arial" panose="020B0604020202020204" pitchFamily="34" charset="0"/>
+              <a:buChar char="•"/>
+            </a:pPr>
+            <a:r>
+              <a:rPr lang="en-US" sz="1800" b="1" dirty="0">
+                <a:solidFill>
+                  <a:srgbClr val="0366D6"/>
+                </a:solidFill>
+                <a:latin typeface="-apple-system"/>
+              </a:rPr>
+              <a:t>One of the challenges we faced was determining the most effective way to explain our data to show how this current pandemic relates to ones in the past.</a:t>
+            </a:r>
+          </a:p>
+          <a:p>
+            <a:pPr marL="285750" indent="-285750" algn="l">
+              <a:buFont typeface="Arial" panose="020B0604020202020204" pitchFamily="34" charset="0"/>
+              <a:buChar char="•"/>
+            </a:pPr>
+            <a:endParaRPr lang="en-US" sz="1800" b="1" dirty="0">
+              <a:solidFill>
+                <a:srgbClr val="0366D6"/>
+              </a:solidFill>
+              <a:latin typeface="-apple-system"/>
+            </a:endParaRPr>
+          </a:p>
+          <a:p>
+            <a:pPr algn="l"/>
+            <a:endParaRPr lang="en-US" sz="1800" b="1" dirty="0">
+              <a:solidFill>
+                <a:srgbClr val="0366D6"/>
+              </a:solidFill>
+              <a:latin typeface="-apple-system"/>
+            </a:endParaRPr>
+          </a:p>
+          <a:p>
+            <a:pPr marL="285750" indent="-285750" algn="l">
+              <a:buFont typeface="Arial" panose="020B0604020202020204" pitchFamily="34" charset="0"/>
+              <a:buChar char="•"/>
+            </a:pPr>
+            <a:r>
+              <a:rPr lang="en-US" sz="1800" b="1" dirty="0">
+                <a:solidFill>
+                  <a:srgbClr val="0366D6"/>
+                </a:solidFill>
+                <a:latin typeface="-apple-system"/>
+              </a:rPr>
+              <a:t>After presenting and realizing there are some major differences between this current pandemic and the ones we discussed, Such as our economy shutting down, We could have factored that into the presentation in some way. </a:t>
+            </a:r>
+          </a:p>
+          <a:p>
+            <a:pPr marL="285750" indent="-285750" algn="l">
+              <a:buFont typeface="Arial" panose="020B0604020202020204" pitchFamily="34" charset="0"/>
+              <a:buChar char="•"/>
+            </a:pPr>
+            <a:endParaRPr lang="en-US" sz="1800" b="1" dirty="0">
+              <a:solidFill>
+                <a:srgbClr val="0366D6"/>
+              </a:solidFill>
+              <a:latin typeface="-apple-system"/>
+            </a:endParaRPr>
+          </a:p>
+          <a:p>
+            <a:pPr algn="l"/>
+            <a:endParaRPr lang="en-US" sz="1800" b="1" dirty="0">
+              <a:solidFill>
+                <a:srgbClr val="0366D6"/>
+              </a:solidFill>
+              <a:latin typeface="-apple-system"/>
+            </a:endParaRPr>
+          </a:p>
+          <a:p>
+            <a:pPr marL="285750" indent="-285750" algn="l">
+              <a:buFont typeface="Arial" panose="020B0604020202020204" pitchFamily="34" charset="0"/>
+              <a:buChar char="•"/>
+            </a:pPr>
+            <a:r>
+              <a:rPr lang="en-US" sz="1800" b="1" dirty="0">
+                <a:solidFill>
+                  <a:srgbClr val="0366D6"/>
+                </a:solidFill>
+                <a:latin typeface="-apple-system"/>
+              </a:rPr>
+              <a:t>We would have loved to have been able to pull more recent data as it relates to the # of cases of covid-19.</a:t>
+            </a:r>
+          </a:p>
+          <a:p>
+            <a:pPr marL="285750" indent="-285750" algn="l">
+              <a:buFont typeface="Arial" panose="020B0604020202020204" pitchFamily="34" charset="0"/>
+              <a:buChar char="•"/>
+            </a:pPr>
+            <a:endParaRPr lang="en-US" sz="1800" b="1" dirty="0">
+              <a:solidFill>
+                <a:srgbClr val="0366D6"/>
+              </a:solidFill>
+              <a:latin typeface="-apple-system"/>
+            </a:endParaRPr>
+          </a:p>
+          <a:p>
+            <a:pPr algn="l"/>
+            <a:r>
+              <a:rPr lang="en-US" sz="1800" b="1" dirty="0">
+                <a:solidFill>
+                  <a:srgbClr val="0366D6"/>
+                </a:solidFill>
+                <a:latin typeface="-apple-system"/>
+              </a:rPr>
+              <a:t> </a:t>
+            </a:r>
+          </a:p>
+          <a:p>
+            <a:pPr marL="285750" indent="-285750" algn="l">
+              <a:buFont typeface="Arial" panose="020B0604020202020204" pitchFamily="34" charset="0"/>
+              <a:buChar char="•"/>
+            </a:pPr>
+            <a:r>
+              <a:rPr lang="en-US" sz="1800" b="1" dirty="0">
+                <a:solidFill>
+                  <a:srgbClr val="0366D6"/>
+                </a:solidFill>
+                <a:latin typeface="-apple-system"/>
+              </a:rPr>
+              <a:t>In doing so, we could have shown how the cases as covid-19 have continued to rise and how the stock market continues to </a:t>
+            </a:r>
+            <a:r>
+              <a:rPr lang="en-US" sz="1800" b="1">
+                <a:solidFill>
+                  <a:srgbClr val="0366D6"/>
+                </a:solidFill>
+                <a:latin typeface="-apple-system"/>
+              </a:rPr>
+              <a:t>show recovery.</a:t>
+            </a:r>
+            <a:endParaRPr lang="en-US" sz="1800" b="1" dirty="0">
+              <a:solidFill>
+                <a:schemeClr val="tx1"/>
+              </a:solidFill>
+              <a:latin typeface="-apple-system"/>
+            </a:endParaRPr>
+          </a:p>
+        </p:txBody>
+      </p:sp>
+    </p:spTree>
+    <p:extLst>
+      <p:ext uri="{BB962C8B-B14F-4D97-AF65-F5344CB8AC3E}">
+        <p14:creationId xmlns:p14="http://schemas.microsoft.com/office/powerpoint/2010/main" val="2081871002"/>
+      </p:ext>
+    </p:extLst>
+  </p:cSld>
+  <p:clrMapOvr>
+    <a:masterClrMapping/>
+  </p:clrMapOvr>
+  <mc:AlternateContent xmlns:mc="http://schemas.openxmlformats.org/markup-compatibility/2006" xmlns:p159="http://schemas.microsoft.com/office/powerpoint/2015/09/main">
+    <mc:Choice Requires="p159">
+      <p:transition xmlns:p14="http://schemas.microsoft.com/office/powerpoint/2010/main" spd="slow" p14:dur="2000">
+        <p159:morph option="byObject"/>
+      </p:transition>
+    </mc:Choice>
+    <mc:Fallback xmlns="">
+      <p:transition spd="slow">
+        <p:fade/>
+      </p:transition>
+    </mc:Fallback>
+  </mc:AlternateContent>
+</p:sld>
+</file>
+
+<file path=ppt/slides/slide11.xml><?xml version="1.0" encoding="utf-8"?>
+<p:sld xmlns:a="http://schemas.openxmlformats.org/drawingml/2006/main" xmlns:r="http://schemas.openxmlformats.org/officeDocument/2006/relationships" xmlns:p="http://schemas.openxmlformats.org/presentationml/2006/main">
+  <p:cSld>
+    <p:bg>
+      <p:bgPr>
+        <a:solidFill>
           <a:schemeClr val="bg2"/>
         </a:solidFill>
         <a:effectLst/>
@@ -6253,7 +6831,7 @@
 </p:sld>
 </file>
 
-<file path=ppt/slides/slide11.xml><?xml version="1.0" encoding="utf-8"?>
+<file path=ppt/slides/slide12.xml><?xml version="1.0" encoding="utf-8"?>
 <p:sld xmlns:a="http://schemas.openxmlformats.org/drawingml/2006/main" xmlns:r="http://schemas.openxmlformats.org/officeDocument/2006/relationships" xmlns:p="http://schemas.openxmlformats.org/presentationml/2006/main">
   <p:cSld>
     <p:bg>
@@ -7758,7 +8336,23 @@
                   <a:schemeClr val="bg1"/>
                 </a:solidFill>
               </a:rPr>
-              <a:t>Filtered / aggregated Data Frame pulled from API</a:t>
+              <a:t>Filtered / aggregated Data Frame pulled from a </a:t>
+            </a:r>
+            <a:r>
+              <a:rPr lang="en-US" dirty="0" err="1">
+                <a:solidFill>
+                  <a:schemeClr val="bg1"/>
+                </a:solidFill>
+              </a:rPr>
+              <a:t>Finnhub</a:t>
+            </a:r>
+            <a:r>
+              <a:rPr lang="en-US" dirty="0">
+                <a:solidFill>
+                  <a:schemeClr val="bg1"/>
+                </a:solidFill>
+              </a:rPr>
+              <a:t> API </a:t>
             </a:r>
           </a:p>
           <a:p>
@@ -8437,7 +9031,23 @@
                   <a:schemeClr val="bg1"/>
                 </a:solidFill>
               </a:rPr>
-              <a:t>Filtered / aggregated Data Frame pulled from API</a:t>
+              <a:t>Filtered / aggregated Data Frame pulled from a </a:t>
+            </a:r>
+            <a:r>
+              <a:rPr lang="en-US" dirty="0" err="1">
+                <a:solidFill>
+                  <a:schemeClr val="bg1"/>
+                </a:solidFill>
+              </a:rPr>
+              <a:t>Finnhub</a:t>
+            </a:r>
+            <a:r>
+              <a:rPr lang="en-US" dirty="0">
+                <a:solidFill>
+                  <a:schemeClr val="bg1"/>
+                </a:solidFill>
+              </a:rPr>
+              <a:t> API </a:t>
             </a:r>
           </a:p>
           <a:p>
@@ -9087,7 +9697,23 @@
                   <a:schemeClr val="bg1"/>
                 </a:solidFill>
               </a:rPr>
-              <a:t>Filtered / aggregated Data Frame pulled from API</a:t>
+              <a:t>Filtered / aggregated Data Frame pulled from a </a:t>
+            </a:r>
+            <a:r>
+              <a:rPr lang="en-US" dirty="0" err="1">
+                <a:solidFill>
+                  <a:schemeClr val="bg1"/>
+                </a:solidFill>
+              </a:rPr>
+              <a:t>Finnhub</a:t>
+            </a:r>
+            <a:r>
+              <a:rPr lang="en-US" dirty="0">
+                <a:solidFill>
+                  <a:schemeClr val="bg1"/>
+                </a:solidFill>
+              </a:rPr>
+              <a:t> API </a:t>
             </a:r>
           </a:p>
           <a:p>
@@ -9448,7 +10074,7 @@
                   <a:schemeClr val="bg1"/>
                 </a:solidFill>
               </a:rPr>
-              <a:t>Now Let’s take  look at 1 major stock (Apple) and how it has performed since 2019</a:t>
+              <a:t>Now Let’s take  look at 1 major stock (Apple) and how it has performed in 2020</a:t>
             </a:r>
           </a:p>
         </p:txBody>

</xml_diff>